<commit_message>
updated block sync sim to accurately detect blocks lost
* final slides for Timon's team presentation
</commit_message>
<xml_diff>
--- a/docs/thesis/SEE_tol_aurora_gbox.pptx
+++ b/docs/thesis/SEE_tol_aurora_gbox.pptx
@@ -4,6 +4,9 @@
   <p:sldMasterIdLst>
     <p:sldMasterId id="2147483732" r:id="rId1"/>
   </p:sldMasterIdLst>
+  <p:notesMasterIdLst>
+    <p:notesMasterId r:id="rId12"/>
+  </p:notesMasterIdLst>
   <p:sldIdLst>
     <p:sldId id="256" r:id="rId2"/>
     <p:sldId id="285" r:id="rId3"/>
@@ -1612,7 +1615,7 @@
                   </c:numRef>
                 </c:yVal>
                 <c:smooth val="0"/>
-                <c:extLst>
+                <c:extLst xmlns:c15="http://schemas.microsoft.com/office/drawing/2012/chart">
                   <c:ext xmlns:c16="http://schemas.microsoft.com/office/drawing/2014/chart" uri="{C3380CC4-5D6E-409C-BE32-E72D297353CC}">
                     <c16:uniqueId val="{00000002-252E-4514-B041-93CF2DF735D5}"/>
                   </c:ext>
@@ -1660,8 +1663,8 @@
                   </a:defRPr>
                 </a:pPr>
                 <a:r>
-                  <a:rPr lang="en-US"/>
-                  <a:t>Offset/Bits Removed</a:t>
+                  <a:rPr lang="en-US" dirty="0"/>
+                  <a:t>Offset/Bits Dropped</a:t>
                 </a:r>
               </a:p>
             </c:rich>
@@ -3412,8 +3415,8 @@
                   </a:defRPr>
                 </a:pPr>
                 <a:r>
-                  <a:rPr lang="en-US"/>
-                  <a:t>Offset/Bits Removed</a:t>
+                  <a:rPr lang="en-US" dirty="0"/>
+                  <a:t>Offset/Bits Dropped</a:t>
                 </a:r>
               </a:p>
             </c:rich>
@@ -5123,8 +5126,8 @@
                   </a:defRPr>
                 </a:pPr>
                 <a:r>
-                  <a:rPr lang="en-US"/>
-                  <a:t>Offset/Bits Removed</a:t>
+                  <a:rPr lang="en-US" dirty="0"/>
+                  <a:t>Offset/Bits Dropped</a:t>
                 </a:r>
               </a:p>
             </c:rich>
@@ -9026,6 +9029,355 @@
 </cs:chartStyle>
 </file>
 
+<file path=ppt/notesMasters/notesMaster1.xml><?xml version="1.0" encoding="utf-8"?>
+<p:notesMaster xmlns:a="http://schemas.openxmlformats.org/drawingml/2006/main" xmlns:r="http://schemas.openxmlformats.org/officeDocument/2006/relationships" xmlns:p="http://schemas.openxmlformats.org/presentationml/2006/main">
+  <p:cSld>
+    <p:bg>
+      <p:bgRef idx="1001">
+        <a:schemeClr val="bg1"/>
+      </p:bgRef>
+    </p:bg>
+    <p:spTree>
+      <p:nvGrpSpPr>
+        <p:cNvPr id="1" name=""/>
+        <p:cNvGrpSpPr/>
+        <p:nvPr/>
+      </p:nvGrpSpPr>
+      <p:grpSpPr>
+        <a:xfrm>
+          <a:off x="0" y="0"/>
+          <a:ext cx="0" cy="0"/>
+          <a:chOff x="0" y="0"/>
+          <a:chExt cx="0" cy="0"/>
+        </a:xfrm>
+      </p:grpSpPr>
+      <p:sp>
+        <p:nvSpPr>
+          <p:cNvPr id="2" name="Header Placeholder 1"/>
+          <p:cNvSpPr>
+            <a:spLocks noGrp="1"/>
+          </p:cNvSpPr>
+          <p:nvPr>
+            <p:ph type="hdr" sz="quarter"/>
+          </p:nvPr>
+        </p:nvSpPr>
+        <p:spPr>
+          <a:xfrm>
+            <a:off x="0" y="0"/>
+            <a:ext cx="2971800" cy="458788"/>
+          </a:xfrm>
+          <a:prstGeom prst="rect">
+            <a:avLst/>
+          </a:prstGeom>
+        </p:spPr>
+        <p:txBody>
+          <a:bodyPr vert="horz" lIns="91440" tIns="45720" rIns="91440" bIns="45720" rtlCol="0"/>
+          <a:lstStyle>
+            <a:lvl1pPr algn="l">
+              <a:defRPr sz="1200"/>
+            </a:lvl1pPr>
+          </a:lstStyle>
+          <a:p>
+            <a:endParaRPr lang="en-US"/>
+          </a:p>
+        </p:txBody>
+      </p:sp>
+      <p:sp>
+        <p:nvSpPr>
+          <p:cNvPr id="3" name="Date Placeholder 2"/>
+          <p:cNvSpPr>
+            <a:spLocks noGrp="1"/>
+          </p:cNvSpPr>
+          <p:nvPr>
+            <p:ph type="dt" idx="1"/>
+          </p:nvPr>
+        </p:nvSpPr>
+        <p:spPr>
+          <a:xfrm>
+            <a:off x="3884613" y="0"/>
+            <a:ext cx="2971800" cy="458788"/>
+          </a:xfrm>
+          <a:prstGeom prst="rect">
+            <a:avLst/>
+          </a:prstGeom>
+        </p:spPr>
+        <p:txBody>
+          <a:bodyPr vert="horz" lIns="91440" tIns="45720" rIns="91440" bIns="45720" rtlCol="0"/>
+          <a:lstStyle>
+            <a:lvl1pPr algn="r">
+              <a:defRPr sz="1200"/>
+            </a:lvl1pPr>
+          </a:lstStyle>
+          <a:p>
+            <a:fld id="{996F5F55-F7B0-48E9-A1A9-39C94EC20DC9}" type="datetimeFigureOut">
+              <a:rPr lang="en-US" smtClean="0"/>
+              <a:t>5/17/2022</a:t>
+            </a:fld>
+            <a:endParaRPr lang="en-US"/>
+          </a:p>
+        </p:txBody>
+      </p:sp>
+      <p:sp>
+        <p:nvSpPr>
+          <p:cNvPr id="4" name="Slide Image Placeholder 3"/>
+          <p:cNvSpPr>
+            <a:spLocks noGrp="1" noRot="1" noChangeAspect="1"/>
+          </p:cNvSpPr>
+          <p:nvPr>
+            <p:ph type="sldImg" idx="2"/>
+          </p:nvPr>
+        </p:nvSpPr>
+        <p:spPr>
+          <a:xfrm>
+            <a:off x="685800" y="1143000"/>
+            <a:ext cx="5486400" cy="3086100"/>
+          </a:xfrm>
+          <a:prstGeom prst="rect">
+            <a:avLst/>
+          </a:prstGeom>
+          <a:noFill/>
+          <a:ln w="12700">
+            <a:solidFill>
+              <a:prstClr val="black"/>
+            </a:solidFill>
+          </a:ln>
+        </p:spPr>
+        <p:txBody>
+          <a:bodyPr vert="horz" lIns="91440" tIns="45720" rIns="91440" bIns="45720" rtlCol="0" anchor="ctr"/>
+          <a:lstStyle/>
+          <a:p>
+            <a:endParaRPr lang="en-US"/>
+          </a:p>
+        </p:txBody>
+      </p:sp>
+      <p:sp>
+        <p:nvSpPr>
+          <p:cNvPr id="5" name="Notes Placeholder 4"/>
+          <p:cNvSpPr>
+            <a:spLocks noGrp="1"/>
+          </p:cNvSpPr>
+          <p:nvPr>
+            <p:ph type="body" sz="quarter" idx="3"/>
+          </p:nvPr>
+        </p:nvSpPr>
+        <p:spPr>
+          <a:xfrm>
+            <a:off x="685800" y="4400550"/>
+            <a:ext cx="5486400" cy="3600450"/>
+          </a:xfrm>
+          <a:prstGeom prst="rect">
+            <a:avLst/>
+          </a:prstGeom>
+        </p:spPr>
+        <p:txBody>
+          <a:bodyPr vert="horz" lIns="91440" tIns="45720" rIns="91440" bIns="45720" rtlCol="0"/>
+          <a:lstStyle/>
+          <a:p>
+            <a:pPr lvl="0"/>
+            <a:r>
+              <a:rPr lang="en-US"/>
+              <a:t>Click to edit Master text styles</a:t>
+            </a:r>
+          </a:p>
+          <a:p>
+            <a:pPr lvl="1"/>
+            <a:r>
+              <a:rPr lang="en-US"/>
+              <a:t>Second level</a:t>
+            </a:r>
+          </a:p>
+          <a:p>
+            <a:pPr lvl="2"/>
+            <a:r>
+              <a:rPr lang="en-US"/>
+              <a:t>Third level</a:t>
+            </a:r>
+          </a:p>
+          <a:p>
+            <a:pPr lvl="3"/>
+            <a:r>
+              <a:rPr lang="en-US"/>
+              <a:t>Fourth level</a:t>
+            </a:r>
+          </a:p>
+          <a:p>
+            <a:pPr lvl="4"/>
+            <a:r>
+              <a:rPr lang="en-US"/>
+              <a:t>Fifth level</a:t>
+            </a:r>
+          </a:p>
+        </p:txBody>
+      </p:sp>
+      <p:sp>
+        <p:nvSpPr>
+          <p:cNvPr id="6" name="Footer Placeholder 5"/>
+          <p:cNvSpPr>
+            <a:spLocks noGrp="1"/>
+          </p:cNvSpPr>
+          <p:nvPr>
+            <p:ph type="ftr" sz="quarter" idx="4"/>
+          </p:nvPr>
+        </p:nvSpPr>
+        <p:spPr>
+          <a:xfrm>
+            <a:off x="0" y="8685213"/>
+            <a:ext cx="2971800" cy="458787"/>
+          </a:xfrm>
+          <a:prstGeom prst="rect">
+            <a:avLst/>
+          </a:prstGeom>
+        </p:spPr>
+        <p:txBody>
+          <a:bodyPr vert="horz" lIns="91440" tIns="45720" rIns="91440" bIns="45720" rtlCol="0" anchor="b"/>
+          <a:lstStyle>
+            <a:lvl1pPr algn="l">
+              <a:defRPr sz="1200"/>
+            </a:lvl1pPr>
+          </a:lstStyle>
+          <a:p>
+            <a:endParaRPr lang="en-US"/>
+          </a:p>
+        </p:txBody>
+      </p:sp>
+      <p:sp>
+        <p:nvSpPr>
+          <p:cNvPr id="7" name="Slide Number Placeholder 6"/>
+          <p:cNvSpPr>
+            <a:spLocks noGrp="1"/>
+          </p:cNvSpPr>
+          <p:nvPr>
+            <p:ph type="sldNum" sz="quarter" idx="5"/>
+          </p:nvPr>
+        </p:nvSpPr>
+        <p:spPr>
+          <a:xfrm>
+            <a:off x="3884613" y="8685213"/>
+            <a:ext cx="2971800" cy="458787"/>
+          </a:xfrm>
+          <a:prstGeom prst="rect">
+            <a:avLst/>
+          </a:prstGeom>
+        </p:spPr>
+        <p:txBody>
+          <a:bodyPr vert="horz" lIns="91440" tIns="45720" rIns="91440" bIns="45720" rtlCol="0" anchor="b"/>
+          <a:lstStyle>
+            <a:lvl1pPr algn="r">
+              <a:defRPr sz="1200"/>
+            </a:lvl1pPr>
+          </a:lstStyle>
+          <a:p>
+            <a:fld id="{C8D41417-15AB-4236-8115-C1E7B980B67F}" type="slidenum">
+              <a:rPr lang="en-US" smtClean="0"/>
+              <a:t>‹#›</a:t>
+            </a:fld>
+            <a:endParaRPr lang="en-US"/>
+          </a:p>
+        </p:txBody>
+      </p:sp>
+    </p:spTree>
+    <p:extLst>
+      <p:ext uri="{BB962C8B-B14F-4D97-AF65-F5344CB8AC3E}">
+        <p14:creationId xmlns:p14="http://schemas.microsoft.com/office/powerpoint/2010/main" val="1636214991"/>
+      </p:ext>
+    </p:extLst>
+  </p:cSld>
+  <p:clrMap bg1="lt1" tx1="dk1" bg2="lt2" tx2="dk2" accent1="accent1" accent2="accent2" accent3="accent3" accent4="accent4" accent5="accent5" accent6="accent6" hlink="hlink" folHlink="folHlink"/>
+  <p:notesStyle>
+    <a:lvl1pPr marL="0" algn="l" defTabSz="914400" rtl="0" eaLnBrk="1" latinLnBrk="0" hangingPunct="1">
+      <a:defRPr sz="1200" kern="1200">
+        <a:solidFill>
+          <a:schemeClr val="tx1"/>
+        </a:solidFill>
+        <a:latin typeface="+mn-lt"/>
+        <a:ea typeface="+mn-ea"/>
+        <a:cs typeface="+mn-cs"/>
+      </a:defRPr>
+    </a:lvl1pPr>
+    <a:lvl2pPr marL="457200" algn="l" defTabSz="914400" rtl="0" eaLnBrk="1" latinLnBrk="0" hangingPunct="1">
+      <a:defRPr sz="1200" kern="1200">
+        <a:solidFill>
+          <a:schemeClr val="tx1"/>
+        </a:solidFill>
+        <a:latin typeface="+mn-lt"/>
+        <a:ea typeface="+mn-ea"/>
+        <a:cs typeface="+mn-cs"/>
+      </a:defRPr>
+    </a:lvl2pPr>
+    <a:lvl3pPr marL="914400" algn="l" defTabSz="914400" rtl="0" eaLnBrk="1" latinLnBrk="0" hangingPunct="1">
+      <a:defRPr sz="1200" kern="1200">
+        <a:solidFill>
+          <a:schemeClr val="tx1"/>
+        </a:solidFill>
+        <a:latin typeface="+mn-lt"/>
+        <a:ea typeface="+mn-ea"/>
+        <a:cs typeface="+mn-cs"/>
+      </a:defRPr>
+    </a:lvl3pPr>
+    <a:lvl4pPr marL="1371600" algn="l" defTabSz="914400" rtl="0" eaLnBrk="1" latinLnBrk="0" hangingPunct="1">
+      <a:defRPr sz="1200" kern="1200">
+        <a:solidFill>
+          <a:schemeClr val="tx1"/>
+        </a:solidFill>
+        <a:latin typeface="+mn-lt"/>
+        <a:ea typeface="+mn-ea"/>
+        <a:cs typeface="+mn-cs"/>
+      </a:defRPr>
+    </a:lvl4pPr>
+    <a:lvl5pPr marL="1828800" algn="l" defTabSz="914400" rtl="0" eaLnBrk="1" latinLnBrk="0" hangingPunct="1">
+      <a:defRPr sz="1200" kern="1200">
+        <a:solidFill>
+          <a:schemeClr val="tx1"/>
+        </a:solidFill>
+        <a:latin typeface="+mn-lt"/>
+        <a:ea typeface="+mn-ea"/>
+        <a:cs typeface="+mn-cs"/>
+      </a:defRPr>
+    </a:lvl5pPr>
+    <a:lvl6pPr marL="2286000" algn="l" defTabSz="914400" rtl="0" eaLnBrk="1" latinLnBrk="0" hangingPunct="1">
+      <a:defRPr sz="1200" kern="1200">
+        <a:solidFill>
+          <a:schemeClr val="tx1"/>
+        </a:solidFill>
+        <a:latin typeface="+mn-lt"/>
+        <a:ea typeface="+mn-ea"/>
+        <a:cs typeface="+mn-cs"/>
+      </a:defRPr>
+    </a:lvl6pPr>
+    <a:lvl7pPr marL="2743200" algn="l" defTabSz="914400" rtl="0" eaLnBrk="1" latinLnBrk="0" hangingPunct="1">
+      <a:defRPr sz="1200" kern="1200">
+        <a:solidFill>
+          <a:schemeClr val="tx1"/>
+        </a:solidFill>
+        <a:latin typeface="+mn-lt"/>
+        <a:ea typeface="+mn-ea"/>
+        <a:cs typeface="+mn-cs"/>
+      </a:defRPr>
+    </a:lvl7pPr>
+    <a:lvl8pPr marL="3200400" algn="l" defTabSz="914400" rtl="0" eaLnBrk="1" latinLnBrk="0" hangingPunct="1">
+      <a:defRPr sz="1200" kern="1200">
+        <a:solidFill>
+          <a:schemeClr val="tx1"/>
+        </a:solidFill>
+        <a:latin typeface="+mn-lt"/>
+        <a:ea typeface="+mn-ea"/>
+        <a:cs typeface="+mn-cs"/>
+      </a:defRPr>
+    </a:lvl8pPr>
+    <a:lvl9pPr marL="3657600" algn="l" defTabSz="914400" rtl="0" eaLnBrk="1" latinLnBrk="0" hangingPunct="1">
+      <a:defRPr sz="1200" kern="1200">
+        <a:solidFill>
+          <a:schemeClr val="tx1"/>
+        </a:solidFill>
+        <a:latin typeface="+mn-lt"/>
+        <a:ea typeface="+mn-ea"/>
+        <a:cs typeface="+mn-cs"/>
+      </a:defRPr>
+    </a:lvl9pPr>
+  </p:notesStyle>
+</p:notesMaster>
+</file>
+
 <file path=ppt/slideLayouts/slideLayout1.xml><?xml version="1.0" encoding="utf-8"?>
 <p:sldLayout xmlns:a="http://schemas.openxmlformats.org/drawingml/2006/main" xmlns:r="http://schemas.openxmlformats.org/officeDocument/2006/relationships" xmlns:p="http://schemas.openxmlformats.org/presentationml/2006/main" showMasterSp="0" type="title" preserve="1">
   <p:cSld name="Title Slide">
@@ -9250,7 +9602,7 @@
           <a:bodyPr/>
           <a:lstStyle/>
           <a:p>
-            <a:fld id="{42B79CD6-8D58-448B-831D-AD6917C1CE37}" type="datetimeFigureOut">
+            <a:fld id="{D8FD9006-805B-4BF4-A097-8A57947E3E59}" type="datetime1">
               <a:rPr lang="en-US" smtClean="0"/>
               <a:t>5/17/2022</a:t>
             </a:fld>
@@ -9458,7 +9810,7 @@
           <a:bodyPr/>
           <a:lstStyle/>
           <a:p>
-            <a:fld id="{42B79CD6-8D58-448B-831D-AD6917C1CE37}" type="datetimeFigureOut">
+            <a:fld id="{EBA02C3A-E180-42E2-BE3C-3AEA7133BFB0}" type="datetime1">
               <a:rPr lang="en-US" smtClean="0"/>
               <a:t>5/17/2022</a:t>
             </a:fld>
@@ -9714,7 +10066,7 @@
           <a:bodyPr/>
           <a:lstStyle/>
           <a:p>
-            <a:fld id="{42B79CD6-8D58-448B-831D-AD6917C1CE37}" type="datetimeFigureOut">
+            <a:fld id="{5C797B06-C8A4-4B6F-8E39-B2CFCC11ADAA}" type="datetime1">
               <a:rPr lang="en-US" smtClean="0"/>
               <a:t>5/17/2022</a:t>
             </a:fld>
@@ -9888,7 +10240,7 @@
           <a:bodyPr/>
           <a:lstStyle/>
           <a:p>
-            <a:fld id="{42B79CD6-8D58-448B-831D-AD6917C1CE37}" type="datetimeFigureOut">
+            <a:fld id="{1E07867A-D57D-4062-AFD1-C260972F3FAC}" type="datetime1">
               <a:rPr lang="en-US" smtClean="0"/>
               <a:t>5/17/2022</a:t>
             </a:fld>
@@ -10231,7 +10583,7 @@
           <a:bodyPr/>
           <a:lstStyle/>
           <a:p>
-            <a:fld id="{42B79CD6-8D58-448B-831D-AD6917C1CE37}" type="datetimeFigureOut">
+            <a:fld id="{402FAAD8-FA50-4999-8C0D-4C15AE64C4E3}" type="datetime1">
               <a:rPr lang="en-US" smtClean="0"/>
               <a:t>5/17/2022</a:t>
             </a:fld>
@@ -10506,7 +10858,7 @@
           <a:bodyPr/>
           <a:lstStyle/>
           <a:p>
-            <a:fld id="{42B79CD6-8D58-448B-831D-AD6917C1CE37}" type="datetimeFigureOut">
+            <a:fld id="{87D1E5D4-C073-46E5-8BB2-ECC55A395C66}" type="datetime1">
               <a:rPr lang="en-US" smtClean="0"/>
               <a:t>5/17/2022</a:t>
             </a:fld>
@@ -10885,7 +11237,7 @@
           <a:bodyPr/>
           <a:lstStyle/>
           <a:p>
-            <a:fld id="{42B79CD6-8D58-448B-831D-AD6917C1CE37}" type="datetimeFigureOut">
+            <a:fld id="{BA2C320D-A181-417F-8904-DF25CC8FC218}" type="datetime1">
               <a:rPr lang="en-US" smtClean="0"/>
               <a:t>5/17/2022</a:t>
             </a:fld>
@@ -11003,7 +11355,7 @@
           <a:bodyPr/>
           <a:lstStyle/>
           <a:p>
-            <a:fld id="{42B79CD6-8D58-448B-831D-AD6917C1CE37}" type="datetimeFigureOut">
+            <a:fld id="{FD650046-4A7E-4E93-9A05-D0BCDA7A3838}" type="datetime1">
               <a:rPr lang="en-US" smtClean="0"/>
               <a:t>5/17/2022</a:t>
             </a:fld>
@@ -11174,7 +11526,7 @@
           <a:bodyPr/>
           <a:lstStyle/>
           <a:p>
-            <a:fld id="{42B79CD6-8D58-448B-831D-AD6917C1CE37}" type="datetimeFigureOut">
+            <a:fld id="{C486D09B-126E-48F1-8059-61786C75D10E}" type="datetime1">
               <a:rPr lang="en-US" smtClean="0"/>
               <a:t>5/17/2022</a:t>
             </a:fld>
@@ -11528,7 +11880,7 @@
             </a:lvl1pPr>
           </a:lstStyle>
           <a:p>
-            <a:fld id="{42B79CD6-8D58-448B-831D-AD6917C1CE37}" type="datetimeFigureOut">
+            <a:fld id="{02457102-9FD1-45AD-9179-C42FDA6983BF}" type="datetime1">
               <a:rPr lang="en-US" smtClean="0"/>
               <a:t>5/17/2022</a:t>
             </a:fld>
@@ -11910,7 +12262,7 @@
           <a:bodyPr/>
           <a:lstStyle/>
           <a:p>
-            <a:fld id="{42B79CD6-8D58-448B-831D-AD6917C1CE37}" type="datetimeFigureOut">
+            <a:fld id="{8B487A45-AF41-42F1-BBD6-7659A139C334}" type="datetime1">
               <a:rPr lang="en-US" smtClean="0"/>
               <a:t>5/17/2022</a:t>
             </a:fld>
@@ -12197,7 +12549,7 @@
             </a:lvl1pPr>
           </a:lstStyle>
           <a:p>
-            <a:fld id="{42B79CD6-8D58-448B-831D-AD6917C1CE37}" type="datetimeFigureOut">
+            <a:fld id="{1E8C6F95-59ED-41D1-9DCB-0FAA30D04EC1}" type="datetime1">
               <a:rPr lang="en-US" smtClean="0"/>
               <a:t>5/17/2022</a:t>
             </a:fld>
@@ -12338,6 +12690,7 @@
     <p:sldLayoutId id="2147483742" r:id="rId10"/>
     <p:sldLayoutId id="2147483743" r:id="rId11"/>
   </p:sldLayoutIdLst>
+  <p:hf hdr="0" ftr="0" dt="0"/>
   <p:txStyles>
     <p:titleStyle>
       <a:lvl1pPr algn="l" defTabSz="914400" rtl="0" eaLnBrk="1" latinLnBrk="0" hangingPunct="1">
@@ -12829,7 +13182,7 @@
                   <a:schemeClr val="tx2"/>
                 </a:solidFill>
               </a:rPr>
-              <a:t>Custom “SEE tolerant” Aurora Gearbox</a:t>
+              <a:t>Custom SEE Tolerant Aurora Gearbox</a:t>
             </a:r>
           </a:p>
         </p:txBody>
@@ -12985,6 +13338,35 @@
           </a:fontRef>
         </p:style>
       </p:sp>
+      <p:sp>
+        <p:nvSpPr>
+          <p:cNvPr id="4" name="Slide Number Placeholder 3">
+            <a:extLst>
+              <a:ext uri="{FF2B5EF4-FFF2-40B4-BE49-F238E27FC236}">
+                <a16:creationId xmlns:a16="http://schemas.microsoft.com/office/drawing/2014/main" id="{C58CF4AE-5B7C-F96B-257D-44E7EEC7BB1D}"/>
+              </a:ext>
+            </a:extLst>
+          </p:cNvPr>
+          <p:cNvSpPr>
+            <a:spLocks noGrp="1"/>
+          </p:cNvSpPr>
+          <p:nvPr>
+            <p:ph type="sldNum" sz="quarter" idx="12"/>
+          </p:nvPr>
+        </p:nvSpPr>
+        <p:spPr/>
+        <p:txBody>
+          <a:bodyPr/>
+          <a:lstStyle/>
+          <a:p>
+            <a:fld id="{9F0033A3-9C62-4E6A-AA88-01AE2E6B437E}" type="slidenum">
+              <a:rPr lang="en-US" smtClean="0"/>
+              <a:t>1</a:t>
+            </a:fld>
+            <a:endParaRPr lang="en-US"/>
+          </a:p>
+        </p:txBody>
+      </p:sp>
     </p:spTree>
     <p:extLst>
       <p:ext uri="{BB962C8B-B14F-4D97-AF65-F5344CB8AC3E}">
@@ -13216,6 +13598,35 @@
               <a:buChar char="§"/>
             </a:pPr>
             <a:endParaRPr lang="en-US" sz="1600" dirty="0"/>
+          </a:p>
+        </p:txBody>
+      </p:sp>
+      <p:sp>
+        <p:nvSpPr>
+          <p:cNvPr id="4" name="Slide Number Placeholder 3">
+            <a:extLst>
+              <a:ext uri="{FF2B5EF4-FFF2-40B4-BE49-F238E27FC236}">
+                <a16:creationId xmlns:a16="http://schemas.microsoft.com/office/drawing/2014/main" id="{7AAD01A1-B492-45D3-EDF5-03A7453B4F6E}"/>
+              </a:ext>
+            </a:extLst>
+          </p:cNvPr>
+          <p:cNvSpPr>
+            <a:spLocks noGrp="1"/>
+          </p:cNvSpPr>
+          <p:nvPr>
+            <p:ph type="sldNum" sz="quarter" idx="12"/>
+          </p:nvPr>
+        </p:nvSpPr>
+        <p:spPr/>
+        <p:txBody>
+          <a:bodyPr/>
+          <a:lstStyle/>
+          <a:p>
+            <a:fld id="{9F0033A3-9C62-4E6A-AA88-01AE2E6B437E}" type="slidenum">
+              <a:rPr lang="en-US" smtClean="0"/>
+              <a:t>10</a:t>
+            </a:fld>
+            <a:endParaRPr lang="en-US"/>
           </a:p>
         </p:txBody>
       </p:sp>
@@ -13426,6 +13837,35 @@
               <a:buChar char="§"/>
             </a:pPr>
             <a:endParaRPr lang="en-US" sz="1600" dirty="0"/>
+          </a:p>
+        </p:txBody>
+      </p:sp>
+      <p:sp>
+        <p:nvSpPr>
+          <p:cNvPr id="4" name="Slide Number Placeholder 3">
+            <a:extLst>
+              <a:ext uri="{FF2B5EF4-FFF2-40B4-BE49-F238E27FC236}">
+                <a16:creationId xmlns:a16="http://schemas.microsoft.com/office/drawing/2014/main" id="{CC53E79E-8706-1256-DB51-8884269D5A9F}"/>
+              </a:ext>
+            </a:extLst>
+          </p:cNvPr>
+          <p:cNvSpPr>
+            <a:spLocks noGrp="1"/>
+          </p:cNvSpPr>
+          <p:nvPr>
+            <p:ph type="sldNum" sz="quarter" idx="12"/>
+          </p:nvPr>
+        </p:nvSpPr>
+        <p:spPr/>
+        <p:txBody>
+          <a:bodyPr/>
+          <a:lstStyle/>
+          <a:p>
+            <a:fld id="{9F0033A3-9C62-4E6A-AA88-01AE2E6B437E}" type="slidenum">
+              <a:rPr lang="en-US" smtClean="0"/>
+              <a:t>2</a:t>
+            </a:fld>
+            <a:endParaRPr lang="en-US"/>
           </a:p>
         </p:txBody>
       </p:sp>
@@ -13497,7 +13937,7 @@
           <a:p>
             <a:r>
               <a:rPr lang="en-US" dirty="0"/>
-              <a:t>Context : Communication </a:t>
+              <a:t>64b/66b Communication </a:t>
             </a:r>
           </a:p>
         </p:txBody>
@@ -13536,7 +13976,7 @@
             </a:pPr>
             <a:r>
               <a:rPr lang="en-US" dirty="0"/>
-              <a:t>The RD53B and YARR DAQ communicate via the 64b/66b Aurora encoding. Four Channels transmit data simultaneously.</a:t>
+              <a:t>The RD53B and YARR DAQ communicate via the 64b/66b Aurora encoding. Up to four channels transmit data simultaneously.</a:t>
             </a:r>
           </a:p>
           <a:p>
@@ -13553,6 +13993,23 @@
             <a:r>
               <a:rPr lang="en-US" dirty="0"/>
               <a:t>Aurora encoding packs together 64 “scrambled” bits of scrambled data with 2 header bits, which can be either a “01” or a “10”.</a:t>
+            </a:r>
+          </a:p>
+          <a:p>
+            <a:pPr lvl="1">
+              <a:buFont typeface="Wingdings" panose="05000000000000000000" pitchFamily="2" charset="2"/>
+              <a:buChar char="§"/>
+            </a:pPr>
+            <a:endParaRPr lang="en-US" dirty="0"/>
+          </a:p>
+          <a:p>
+            <a:pPr lvl="1">
+              <a:buFont typeface="Wingdings" panose="05000000000000000000" pitchFamily="2" charset="2"/>
+              <a:buChar char="§"/>
+            </a:pPr>
+            <a:r>
+              <a:rPr lang="en-US" dirty="0"/>
+              <a:t>The header bits are used to determine alignment and are expected to be seen every 66 bits.</a:t>
             </a:r>
           </a:p>
           <a:p>
@@ -13633,6 +14090,35 @@
           </a:prstGeom>
         </p:spPr>
       </p:pic>
+      <p:sp>
+        <p:nvSpPr>
+          <p:cNvPr id="4" name="Slide Number Placeholder 3">
+            <a:extLst>
+              <a:ext uri="{FF2B5EF4-FFF2-40B4-BE49-F238E27FC236}">
+                <a16:creationId xmlns:a16="http://schemas.microsoft.com/office/drawing/2014/main" id="{1EB363A6-CC0B-EE4B-9711-908941C8A1C3}"/>
+              </a:ext>
+            </a:extLst>
+          </p:cNvPr>
+          <p:cNvSpPr>
+            <a:spLocks noGrp="1"/>
+          </p:cNvSpPr>
+          <p:nvPr>
+            <p:ph type="sldNum" sz="quarter" idx="12"/>
+          </p:nvPr>
+        </p:nvSpPr>
+        <p:spPr/>
+        <p:txBody>
+          <a:bodyPr/>
+          <a:lstStyle/>
+          <a:p>
+            <a:fld id="{9F0033A3-9C62-4E6A-AA88-01AE2E6B437E}" type="slidenum">
+              <a:rPr lang="en-US" smtClean="0"/>
+              <a:t>3</a:t>
+            </a:fld>
+            <a:endParaRPr lang="en-US"/>
+          </a:p>
+        </p:txBody>
+      </p:sp>
     </p:spTree>
     <p:extLst>
       <p:ext uri="{BB962C8B-B14F-4D97-AF65-F5344CB8AC3E}">
@@ -13686,7 +14172,7 @@
           <a:p>
             <a:r>
               <a:rPr lang="en-US" dirty="0"/>
-              <a:t>Context : Single Event Effects (SEEs)</a:t>
+              <a:t>Modeling SEEs</a:t>
             </a:r>
           </a:p>
         </p:txBody>
@@ -13709,8 +14195,8 @@
         </p:nvSpPr>
         <p:spPr>
           <a:xfrm>
-            <a:off x="1097281" y="1855894"/>
-            <a:ext cx="5500072" cy="4207196"/>
+            <a:off x="1097280" y="1855894"/>
+            <a:ext cx="10058399" cy="4207196"/>
           </a:xfrm>
         </p:spPr>
         <p:txBody>
@@ -13724,7 +14210,7 @@
             </a:pPr>
             <a:r>
               <a:rPr lang="en-US" dirty="0"/>
-              <a:t>Single Event Effects are radiation inflicted damage that can result in glitches or bit flips.</a:t>
+              <a:t>Single Event Effects are radiation inflicted damage that can result in bit flips or glitches.</a:t>
             </a:r>
           </a:p>
           <a:p>
@@ -13748,14 +14234,8 @@
             </a:r>
             <a:r>
               <a:rPr lang="en-US" dirty="0"/>
-              <a:t>: A bit flip of a memory register. </a:t>
+              <a:t>: A bit flip of a memory register, modeled as a bit flip in one or more bits transmitted.</a:t>
             </a:r>
-          </a:p>
-          <a:p>
-            <a:pPr marL="384048" lvl="2" indent="0">
-              <a:buNone/>
-            </a:pPr>
-            <a:endParaRPr lang="en-US" dirty="0"/>
           </a:p>
           <a:p>
             <a:pPr lvl="1">
@@ -13772,7 +14252,7 @@
             </a:r>
             <a:r>
               <a:rPr lang="en-US" dirty="0"/>
-              <a:t>: A voltage glitch on a line, especially dangerous if on a clock or reset.</a:t>
+              <a:t>: A voltage glitch on a line, results in a glitch being captured (bit flip) or bits being added or dropped from transmission. </a:t>
             </a:r>
           </a:p>
           <a:p>
@@ -13817,12 +14297,358 @@
           </a:p>
         </p:txBody>
       </p:sp>
+      <p:sp>
+        <p:nvSpPr>
+          <p:cNvPr id="5" name="Slide Number Placeholder 4">
+            <a:extLst>
+              <a:ext uri="{FF2B5EF4-FFF2-40B4-BE49-F238E27FC236}">
+                <a16:creationId xmlns:a16="http://schemas.microsoft.com/office/drawing/2014/main" id="{F1F70BFA-C41B-8DA7-3AF2-213A1FE7D299}"/>
+              </a:ext>
+            </a:extLst>
+          </p:cNvPr>
+          <p:cNvSpPr>
+            <a:spLocks noGrp="1"/>
+          </p:cNvSpPr>
+          <p:nvPr>
+            <p:ph type="sldNum" sz="quarter" idx="12"/>
+          </p:nvPr>
+        </p:nvSpPr>
+        <p:spPr/>
+        <p:txBody>
+          <a:bodyPr/>
+          <a:lstStyle/>
+          <a:p>
+            <a:fld id="{9F0033A3-9C62-4E6A-AA88-01AE2E6B437E}" type="slidenum">
+              <a:rPr lang="en-US" smtClean="0"/>
+              <a:t>4</a:t>
+            </a:fld>
+            <a:endParaRPr lang="en-US"/>
+          </a:p>
+        </p:txBody>
+      </p:sp>
+      <p:sp>
+        <p:nvSpPr>
+          <p:cNvPr id="12" name="Content Placeholder 2">
+            <a:extLst>
+              <a:ext uri="{FF2B5EF4-FFF2-40B4-BE49-F238E27FC236}">
+                <a16:creationId xmlns:a16="http://schemas.microsoft.com/office/drawing/2014/main" id="{8C3AB86C-9654-6808-2DFF-B4120C565156}"/>
+              </a:ext>
+            </a:extLst>
+          </p:cNvPr>
+          <p:cNvSpPr txBox="1">
+            <a:spLocks/>
+          </p:cNvSpPr>
+          <p:nvPr/>
+        </p:nvSpPr>
+        <p:spPr>
+          <a:xfrm>
+            <a:off x="1249680" y="3784060"/>
+            <a:ext cx="10058399" cy="2431430"/>
+          </a:xfrm>
+          <a:prstGeom prst="rect">
+            <a:avLst/>
+          </a:prstGeom>
+        </p:spPr>
+        <p:txBody>
+          <a:bodyPr vert="horz" lIns="0" tIns="45720" rIns="0" bIns="45720" rtlCol="0">
+            <a:normAutofit/>
+          </a:bodyPr>
+          <a:lstStyle>
+            <a:lvl1pPr marL="91440" indent="-91440" algn="l" defTabSz="914400" rtl="0" eaLnBrk="1" latinLnBrk="0" hangingPunct="1">
+              <a:lnSpc>
+                <a:spcPct val="90000"/>
+              </a:lnSpc>
+              <a:spcBef>
+                <a:spcPts val="1200"/>
+              </a:spcBef>
+              <a:spcAft>
+                <a:spcPts val="200"/>
+              </a:spcAft>
+              <a:buClr>
+                <a:schemeClr val="accent1"/>
+              </a:buClr>
+              <a:buSzPct val="100000"/>
+              <a:buFont typeface="Calibri" panose="020F0502020204030204" pitchFamily="34" charset="0"/>
+              <a:buChar char=" "/>
+              <a:defRPr sz="2000" kern="1200">
+                <a:solidFill>
+                  <a:schemeClr val="tx1">
+                    <a:lumMod val="75000"/>
+                    <a:lumOff val="25000"/>
+                  </a:schemeClr>
+                </a:solidFill>
+                <a:latin typeface="+mn-lt"/>
+                <a:ea typeface="+mn-ea"/>
+                <a:cs typeface="+mn-cs"/>
+              </a:defRPr>
+            </a:lvl1pPr>
+            <a:lvl2pPr marL="384048" indent="-182880" algn="l" defTabSz="914400" rtl="0" eaLnBrk="1" latinLnBrk="0" hangingPunct="1">
+              <a:lnSpc>
+                <a:spcPct val="90000"/>
+              </a:lnSpc>
+              <a:spcBef>
+                <a:spcPts val="200"/>
+              </a:spcBef>
+              <a:spcAft>
+                <a:spcPts val="400"/>
+              </a:spcAft>
+              <a:buClr>
+                <a:schemeClr val="accent1"/>
+              </a:buClr>
+              <a:buFont typeface="Calibri" pitchFamily="34" charset="0"/>
+              <a:buChar char="◦"/>
+              <a:defRPr sz="1800" kern="1200">
+                <a:solidFill>
+                  <a:schemeClr val="tx1">
+                    <a:lumMod val="75000"/>
+                    <a:lumOff val="25000"/>
+                  </a:schemeClr>
+                </a:solidFill>
+                <a:latin typeface="+mn-lt"/>
+                <a:ea typeface="+mn-ea"/>
+                <a:cs typeface="+mn-cs"/>
+              </a:defRPr>
+            </a:lvl2pPr>
+            <a:lvl3pPr marL="566928" indent="-182880" algn="l" defTabSz="914400" rtl="0" eaLnBrk="1" latinLnBrk="0" hangingPunct="1">
+              <a:lnSpc>
+                <a:spcPct val="90000"/>
+              </a:lnSpc>
+              <a:spcBef>
+                <a:spcPts val="200"/>
+              </a:spcBef>
+              <a:spcAft>
+                <a:spcPts val="400"/>
+              </a:spcAft>
+              <a:buClr>
+                <a:schemeClr val="accent1"/>
+              </a:buClr>
+              <a:buFont typeface="Calibri" pitchFamily="34" charset="0"/>
+              <a:buChar char="◦"/>
+              <a:defRPr sz="1400" kern="1200">
+                <a:solidFill>
+                  <a:schemeClr val="tx1">
+                    <a:lumMod val="75000"/>
+                    <a:lumOff val="25000"/>
+                  </a:schemeClr>
+                </a:solidFill>
+                <a:latin typeface="+mn-lt"/>
+                <a:ea typeface="+mn-ea"/>
+                <a:cs typeface="+mn-cs"/>
+              </a:defRPr>
+            </a:lvl3pPr>
+            <a:lvl4pPr marL="749808" indent="-182880" algn="l" defTabSz="914400" rtl="0" eaLnBrk="1" latinLnBrk="0" hangingPunct="1">
+              <a:lnSpc>
+                <a:spcPct val="90000"/>
+              </a:lnSpc>
+              <a:spcBef>
+                <a:spcPts val="200"/>
+              </a:spcBef>
+              <a:spcAft>
+                <a:spcPts val="400"/>
+              </a:spcAft>
+              <a:buClr>
+                <a:schemeClr val="accent1"/>
+              </a:buClr>
+              <a:buFont typeface="Calibri" pitchFamily="34" charset="0"/>
+              <a:buChar char="◦"/>
+              <a:defRPr sz="1400" kern="1200">
+                <a:solidFill>
+                  <a:schemeClr val="tx1">
+                    <a:lumMod val="75000"/>
+                    <a:lumOff val="25000"/>
+                  </a:schemeClr>
+                </a:solidFill>
+                <a:latin typeface="+mn-lt"/>
+                <a:ea typeface="+mn-ea"/>
+                <a:cs typeface="+mn-cs"/>
+              </a:defRPr>
+            </a:lvl4pPr>
+            <a:lvl5pPr marL="932688" indent="-182880" algn="l" defTabSz="914400" rtl="0" eaLnBrk="1" latinLnBrk="0" hangingPunct="1">
+              <a:lnSpc>
+                <a:spcPct val="90000"/>
+              </a:lnSpc>
+              <a:spcBef>
+                <a:spcPts val="200"/>
+              </a:spcBef>
+              <a:spcAft>
+                <a:spcPts val="400"/>
+              </a:spcAft>
+              <a:buClr>
+                <a:schemeClr val="accent1"/>
+              </a:buClr>
+              <a:buFont typeface="Calibri" pitchFamily="34" charset="0"/>
+              <a:buChar char="◦"/>
+              <a:defRPr sz="1400" kern="1200">
+                <a:solidFill>
+                  <a:schemeClr val="tx1">
+                    <a:lumMod val="75000"/>
+                    <a:lumOff val="25000"/>
+                  </a:schemeClr>
+                </a:solidFill>
+                <a:latin typeface="+mn-lt"/>
+                <a:ea typeface="+mn-ea"/>
+                <a:cs typeface="+mn-cs"/>
+              </a:defRPr>
+            </a:lvl5pPr>
+            <a:lvl6pPr marL="1100000" indent="-228600" algn="l" defTabSz="914400" rtl="0" eaLnBrk="1" latinLnBrk="0" hangingPunct="1">
+              <a:lnSpc>
+                <a:spcPct val="90000"/>
+              </a:lnSpc>
+              <a:spcBef>
+                <a:spcPts val="200"/>
+              </a:spcBef>
+              <a:spcAft>
+                <a:spcPts val="400"/>
+              </a:spcAft>
+              <a:buClr>
+                <a:schemeClr val="accent1"/>
+              </a:buClr>
+              <a:buFont typeface="Calibri" pitchFamily="34" charset="0"/>
+              <a:buChar char="◦"/>
+              <a:defRPr sz="1400" kern="1200">
+                <a:solidFill>
+                  <a:schemeClr val="tx1">
+                    <a:lumMod val="75000"/>
+                    <a:lumOff val="25000"/>
+                  </a:schemeClr>
+                </a:solidFill>
+                <a:latin typeface="+mn-lt"/>
+                <a:ea typeface="+mn-ea"/>
+                <a:cs typeface="+mn-cs"/>
+              </a:defRPr>
+            </a:lvl6pPr>
+            <a:lvl7pPr marL="1300000" indent="-228600" algn="l" defTabSz="914400" rtl="0" eaLnBrk="1" latinLnBrk="0" hangingPunct="1">
+              <a:lnSpc>
+                <a:spcPct val="90000"/>
+              </a:lnSpc>
+              <a:spcBef>
+                <a:spcPts val="200"/>
+              </a:spcBef>
+              <a:spcAft>
+                <a:spcPts val="400"/>
+              </a:spcAft>
+              <a:buClr>
+                <a:schemeClr val="accent1"/>
+              </a:buClr>
+              <a:buFont typeface="Calibri" pitchFamily="34" charset="0"/>
+              <a:buChar char="◦"/>
+              <a:defRPr sz="1400" kern="1200">
+                <a:solidFill>
+                  <a:schemeClr val="tx1">
+                    <a:lumMod val="75000"/>
+                    <a:lumOff val="25000"/>
+                  </a:schemeClr>
+                </a:solidFill>
+                <a:latin typeface="+mn-lt"/>
+                <a:ea typeface="+mn-ea"/>
+                <a:cs typeface="+mn-cs"/>
+              </a:defRPr>
+            </a:lvl7pPr>
+            <a:lvl8pPr marL="1500000" indent="-228600" algn="l" defTabSz="914400" rtl="0" eaLnBrk="1" latinLnBrk="0" hangingPunct="1">
+              <a:lnSpc>
+                <a:spcPct val="90000"/>
+              </a:lnSpc>
+              <a:spcBef>
+                <a:spcPts val="200"/>
+              </a:spcBef>
+              <a:spcAft>
+                <a:spcPts val="400"/>
+              </a:spcAft>
+              <a:buClr>
+                <a:schemeClr val="accent1"/>
+              </a:buClr>
+              <a:buFont typeface="Calibri" pitchFamily="34" charset="0"/>
+              <a:buChar char="◦"/>
+              <a:defRPr sz="1400" kern="1200">
+                <a:solidFill>
+                  <a:schemeClr val="tx1">
+                    <a:lumMod val="75000"/>
+                    <a:lumOff val="25000"/>
+                  </a:schemeClr>
+                </a:solidFill>
+                <a:latin typeface="+mn-lt"/>
+                <a:ea typeface="+mn-ea"/>
+                <a:cs typeface="+mn-cs"/>
+              </a:defRPr>
+            </a:lvl8pPr>
+            <a:lvl9pPr marL="1700000" indent="-228600" algn="l" defTabSz="914400" rtl="0" eaLnBrk="1" latinLnBrk="0" hangingPunct="1">
+              <a:lnSpc>
+                <a:spcPct val="90000"/>
+              </a:lnSpc>
+              <a:spcBef>
+                <a:spcPts val="200"/>
+              </a:spcBef>
+              <a:spcAft>
+                <a:spcPts val="400"/>
+              </a:spcAft>
+              <a:buClr>
+                <a:schemeClr val="accent1"/>
+              </a:buClr>
+              <a:buFont typeface="Calibri" pitchFamily="34" charset="0"/>
+              <a:buChar char="◦"/>
+              <a:defRPr sz="1400" kern="1200">
+                <a:solidFill>
+                  <a:schemeClr val="tx1">
+                    <a:lumMod val="75000"/>
+                    <a:lumOff val="25000"/>
+                  </a:schemeClr>
+                </a:solidFill>
+                <a:latin typeface="+mn-lt"/>
+                <a:ea typeface="+mn-ea"/>
+                <a:cs typeface="+mn-cs"/>
+              </a:defRPr>
+            </a:lvl9pPr>
+          </a:lstStyle>
+          <a:p>
+            <a:pPr lvl="2">
+              <a:buFont typeface="Arial" panose="020B0604020202020204" pitchFamily="34" charset="0"/>
+              <a:buChar char="•"/>
+            </a:pPr>
+            <a:endParaRPr lang="en-US" dirty="0"/>
+          </a:p>
+          <a:p>
+            <a:pPr marL="201168" lvl="1" indent="0">
+              <a:buFont typeface="Calibri" pitchFamily="34" charset="0"/>
+              <a:buNone/>
+            </a:pPr>
+            <a:endParaRPr lang="en-US" dirty="0"/>
+          </a:p>
+          <a:p>
+            <a:pPr lvl="2">
+              <a:buFont typeface="Wingdings" panose="05000000000000000000" pitchFamily="2" charset="2"/>
+              <a:buChar char="§"/>
+            </a:pPr>
+            <a:endParaRPr lang="en-US" dirty="0"/>
+          </a:p>
+          <a:p>
+            <a:pPr marL="384048" lvl="2" indent="0">
+              <a:buFont typeface="Calibri" pitchFamily="34" charset="0"/>
+              <a:buNone/>
+            </a:pPr>
+            <a:endParaRPr lang="en-US" sz="1200" dirty="0"/>
+          </a:p>
+          <a:p>
+            <a:pPr lvl="2">
+              <a:buFont typeface="Wingdings" panose="05000000000000000000" pitchFamily="2" charset="2"/>
+              <a:buChar char="§"/>
+            </a:pPr>
+            <a:endParaRPr lang="en-US" sz="1200" dirty="0"/>
+          </a:p>
+          <a:p>
+            <a:pPr lvl="1">
+              <a:buFont typeface="Wingdings" panose="05000000000000000000" pitchFamily="2" charset="2"/>
+              <a:buChar char="§"/>
+            </a:pPr>
+            <a:endParaRPr lang="en-US" sz="1600" dirty="0"/>
+          </a:p>
+        </p:txBody>
+      </p:sp>
       <p:pic>
         <p:nvPicPr>
-          <p:cNvPr id="4" name="Picture 3" descr="A picture containing diagram&#10;&#10;Description automatically generated">
+          <p:cNvPr id="14" name="Picture 13">
             <a:extLst>
               <a:ext uri="{FF2B5EF4-FFF2-40B4-BE49-F238E27FC236}">
-                <a16:creationId xmlns:a16="http://schemas.microsoft.com/office/drawing/2014/main" id="{1F8A9486-54AF-895A-ADF4-D1DACBDE9815}"/>
+                <a16:creationId xmlns:a16="http://schemas.microsoft.com/office/drawing/2014/main" id="{69A68BD8-6456-89AA-5E86-123D9F3BB1CA}"/>
               </a:ext>
             </a:extLst>
           </p:cNvPr>
@@ -13839,8 +14665,8 @@
         </p:blipFill>
         <p:spPr>
           <a:xfrm>
-            <a:off x="6867939" y="1855894"/>
-            <a:ext cx="4150476" cy="3770542"/>
+            <a:off x="1980843" y="3959492"/>
+            <a:ext cx="8230313" cy="1676545"/>
           </a:xfrm>
           <a:prstGeom prst="rect">
             <a:avLst/>
@@ -13924,73 +14750,111 @@
         <p:spPr>
           <a:xfrm>
             <a:off x="1097280" y="1845734"/>
-            <a:ext cx="4647537" cy="4023360"/>
+            <a:ext cx="10058400" cy="4023360"/>
           </a:xfrm>
         </p:spPr>
         <p:txBody>
           <a:bodyPr/>
           <a:lstStyle/>
           <a:p>
-            <a:r>
-              <a:rPr lang="en-US" dirty="0"/>
-              <a:t>We can ignore the physics surrounding SEEs and represent them in digital logic as bit flips, bit drops, and bit adds:</a:t>
-            </a:r>
-          </a:p>
-          <a:p>
-            <a:pPr marL="749808" lvl="1" indent="-457200">
-              <a:buFont typeface="+mj-lt"/>
-              <a:buAutoNum type="alphaLcParenR"/>
+            <a:pPr marL="201168" lvl="1" indent="0">
+              <a:buNone/>
+            </a:pPr>
+            <a:endParaRPr lang="en-US" sz="1800" dirty="0"/>
+          </a:p>
+          <a:p>
+            <a:pPr lvl="1">
+              <a:buFont typeface="Wingdings" panose="05000000000000000000" pitchFamily="2" charset="2"/>
+              <a:buChar char="§"/>
             </a:pPr>
             <a:r>
               <a:rPr lang="en-US" dirty="0"/>
-              <a:t>Header bits are seen consistently, we’re in sync.</a:t>
+              <a:t>Once a data block is corrupted through an SEE it is lost and can’t be recovered.</a:t>
             </a:r>
           </a:p>
           <a:p>
-            <a:pPr marL="749808" lvl="1" indent="-457200">
-              <a:buFont typeface="+mj-lt"/>
-              <a:buAutoNum type="alphaLcParenR"/>
+            <a:pPr marL="201168" lvl="1" indent="0">
+              <a:buNone/>
+            </a:pPr>
+            <a:endParaRPr lang="en-US" dirty="0"/>
+          </a:p>
+          <a:p>
+            <a:pPr lvl="1">
+              <a:buFont typeface="Wingdings" panose="05000000000000000000" pitchFamily="2" charset="2"/>
+              <a:buChar char="§"/>
             </a:pPr>
             <a:r>
               <a:rPr lang="en-US" dirty="0"/>
-              <a:t>A bit flip causes a header to be invalid, ideally still in sync.</a:t>
+              <a:t>Bit adds, bit drops, and certain bit flips result in header misalignment. </a:t>
             </a:r>
           </a:p>
           <a:p>
-            <a:pPr marL="749808" lvl="1" indent="-457200">
-              <a:buFont typeface="+mj-lt"/>
-              <a:buAutoNum type="alphaLcParenR"/>
+            <a:pPr lvl="1">
+              <a:buFont typeface="Wingdings" panose="05000000000000000000" pitchFamily="2" charset="2"/>
+              <a:buChar char="§"/>
+            </a:pPr>
+            <a:endParaRPr lang="en-US" dirty="0"/>
+          </a:p>
+          <a:p>
+            <a:pPr lvl="1">
+              <a:buFont typeface="Wingdings" panose="05000000000000000000" pitchFamily="2" charset="2"/>
+              <a:buChar char="§"/>
             </a:pPr>
             <a:r>
               <a:rPr lang="en-US" dirty="0"/>
-              <a:t>A bit drop resulting in the header bits “moving”, no longer in sync.</a:t>
+              <a:t>An effective solution minimizes the downtime and blocks lost during alignment resynchronization.</a:t>
             </a:r>
           </a:p>
           <a:p>
-            <a:pPr marL="749808" lvl="1" indent="-457200">
-              <a:buFont typeface="+mj-lt"/>
-              <a:buAutoNum type="alphaLcParenR"/>
-            </a:pPr>
-            <a:r>
-              <a:rPr lang="en-US" dirty="0"/>
-              <a:t>A bit add resulting in the header bits “moving”, no longer in sync.</a:t>
-            </a:r>
-          </a:p>
-          <a:p>
-            <a:pPr marL="749808" lvl="1" indent="-457200">
-              <a:buFont typeface="+mj-lt"/>
-              <a:buAutoNum type="alphaLcParenR"/>
+            <a:pPr marL="201168" lvl="1" indent="0">
+              <a:buNone/>
             </a:pPr>
             <a:endParaRPr lang="en-US" dirty="0"/>
+          </a:p>
+          <a:p>
+            <a:pPr lvl="1">
+              <a:buFont typeface="Wingdings" panose="05000000000000000000" pitchFamily="2" charset="2"/>
+              <a:buChar char="§"/>
+            </a:pPr>
+            <a:endParaRPr lang="en-US" dirty="0"/>
+          </a:p>
+        </p:txBody>
+      </p:sp>
+      <p:sp>
+        <p:nvSpPr>
+          <p:cNvPr id="4" name="Slide Number Placeholder 3">
+            <a:extLst>
+              <a:ext uri="{FF2B5EF4-FFF2-40B4-BE49-F238E27FC236}">
+                <a16:creationId xmlns:a16="http://schemas.microsoft.com/office/drawing/2014/main" id="{C9D51DC4-4452-07CD-C69B-A8758F3F9DC0}"/>
+              </a:ext>
+            </a:extLst>
+          </p:cNvPr>
+          <p:cNvSpPr>
+            <a:spLocks noGrp="1"/>
+          </p:cNvSpPr>
+          <p:nvPr>
+            <p:ph type="sldNum" sz="quarter" idx="12"/>
+          </p:nvPr>
+        </p:nvSpPr>
+        <p:spPr/>
+        <p:txBody>
+          <a:bodyPr/>
+          <a:lstStyle/>
+          <a:p>
+            <a:fld id="{9F0033A3-9C62-4E6A-AA88-01AE2E6B437E}" type="slidenum">
+              <a:rPr lang="en-US" smtClean="0"/>
+              <a:t>5</a:t>
+            </a:fld>
+            <a:endParaRPr lang="en-US"/>
           </a:p>
         </p:txBody>
       </p:sp>
       <p:pic>
         <p:nvPicPr>
-          <p:cNvPr id="7" name="Picture 6">
+          <p:cNvPr id="11" name="Picture 10">
             <a:extLst>
               <a:ext uri="{FF2B5EF4-FFF2-40B4-BE49-F238E27FC236}">
-                <a16:creationId xmlns:a16="http://schemas.microsoft.com/office/drawing/2014/main" id="{B1B7A1D2-83AD-3446-4363-4ACB09DC4892}"/>
+                <a16:creationId xmlns:a16="http://schemas.microsoft.com/office/drawing/2014/main" id="{EAB820E9-FC52-C7BA-4494-42A174DAB614}"/>
               </a:ext>
             </a:extLst>
           </p:cNvPr>
@@ -14007,8 +14871,8 @@
         </p:blipFill>
         <p:spPr>
           <a:xfrm>
-            <a:off x="5656733" y="2398113"/>
-            <a:ext cx="6312730" cy="2543542"/>
+            <a:off x="1066364" y="4534731"/>
+            <a:ext cx="10059272" cy="1018120"/>
           </a:xfrm>
           <a:prstGeom prst="rect">
             <a:avLst/>
@@ -14359,7 +15223,15 @@
             </a:pPr>
             <a:r>
               <a:rPr lang="en-US" dirty="0"/>
-              <a:t>Utilizes two bit slipping mechanisms simultaneously to shift headers back into correct position.</a:t>
+              <a:t>Utilizes two bit slipping mechanisms simultaneously to shift header </a:t>
+            </a:r>
+            <a:r>
+              <a:rPr lang="en-US" dirty="0" err="1"/>
+              <a:t>bitsback</a:t>
+            </a:r>
+            <a:r>
+              <a:rPr lang="en-US" dirty="0"/>
+              <a:t> into correct alignment.</a:t>
             </a:r>
           </a:p>
           <a:p>
@@ -14440,7 +15312,7 @@
             <p:ph idx="1"/>
             <p:extLst>
               <p:ext uri="{D42A27DB-BD31-4B8C-83A1-F6EECF244321}">
-                <p14:modId xmlns:p14="http://schemas.microsoft.com/office/powerpoint/2010/main" val="3777783367"/>
+                <p14:modId xmlns:p14="http://schemas.microsoft.com/office/powerpoint/2010/main" val="1938381545"/>
               </p:ext>
             </p:extLst>
           </p:nvPr>
@@ -14455,6 +15327,35 @@
           </a:graphicData>
         </a:graphic>
       </p:graphicFrame>
+      <p:sp>
+        <p:nvSpPr>
+          <p:cNvPr id="3" name="Slide Number Placeholder 2">
+            <a:extLst>
+              <a:ext uri="{FF2B5EF4-FFF2-40B4-BE49-F238E27FC236}">
+                <a16:creationId xmlns:a16="http://schemas.microsoft.com/office/drawing/2014/main" id="{9E835EFE-063E-1228-A3F3-0BC4C667D65D}"/>
+              </a:ext>
+            </a:extLst>
+          </p:cNvPr>
+          <p:cNvSpPr>
+            <a:spLocks noGrp="1"/>
+          </p:cNvSpPr>
+          <p:nvPr>
+            <p:ph type="sldNum" sz="quarter" idx="12"/>
+          </p:nvPr>
+        </p:nvSpPr>
+        <p:spPr/>
+        <p:txBody>
+          <a:bodyPr/>
+          <a:lstStyle/>
+          <a:p>
+            <a:fld id="{9F0033A3-9C62-4E6A-AA88-01AE2E6B437E}" type="slidenum">
+              <a:rPr lang="en-US" smtClean="0"/>
+              <a:t>6</a:t>
+            </a:fld>
+            <a:endParaRPr lang="en-US"/>
+          </a:p>
+        </p:txBody>
+      </p:sp>
     </p:spTree>
     <p:extLst>
       <p:ext uri="{BB962C8B-B14F-4D97-AF65-F5344CB8AC3E}">
@@ -14508,7 +15409,7 @@
           <a:p>
             <a:r>
               <a:rPr lang="en-US" dirty="0"/>
-              <a:t>New and Improved Resync Scheme</a:t>
+              <a:t>Free Improved Resync Scheme</a:t>
             </a:r>
           </a:p>
         </p:txBody>
@@ -14846,7 +15747,7 @@
             <p:ph idx="1"/>
             <p:extLst>
               <p:ext uri="{D42A27DB-BD31-4B8C-83A1-F6EECF244321}">
-                <p14:modId xmlns:p14="http://schemas.microsoft.com/office/powerpoint/2010/main" val="4017167527"/>
+                <p14:modId xmlns:p14="http://schemas.microsoft.com/office/powerpoint/2010/main" val="1807620747"/>
               </p:ext>
             </p:extLst>
           </p:nvPr>
@@ -14861,6 +15762,35 @@
           </a:graphicData>
         </a:graphic>
       </p:graphicFrame>
+      <p:sp>
+        <p:nvSpPr>
+          <p:cNvPr id="3" name="Slide Number Placeholder 2">
+            <a:extLst>
+              <a:ext uri="{FF2B5EF4-FFF2-40B4-BE49-F238E27FC236}">
+                <a16:creationId xmlns:a16="http://schemas.microsoft.com/office/drawing/2014/main" id="{36915DD6-19BE-A623-7EF9-69D3F8AFCC21}"/>
+              </a:ext>
+            </a:extLst>
+          </p:cNvPr>
+          <p:cNvSpPr>
+            <a:spLocks noGrp="1"/>
+          </p:cNvSpPr>
+          <p:nvPr>
+            <p:ph type="sldNum" sz="quarter" idx="12"/>
+          </p:nvPr>
+        </p:nvSpPr>
+        <p:spPr/>
+        <p:txBody>
+          <a:bodyPr/>
+          <a:lstStyle/>
+          <a:p>
+            <a:fld id="{9F0033A3-9C62-4E6A-AA88-01AE2E6B437E}" type="slidenum">
+              <a:rPr lang="en-US" smtClean="0"/>
+              <a:t>7</a:t>
+            </a:fld>
+            <a:endParaRPr lang="en-US"/>
+          </a:p>
+        </p:txBody>
+      </p:sp>
     </p:spTree>
     <p:extLst>
       <p:ext uri="{BB962C8B-B14F-4D97-AF65-F5344CB8AC3E}">
@@ -15242,6 +16172,23 @@
             </a:r>
           </a:p>
           <a:p>
+            <a:pPr lvl="1">
+              <a:buFont typeface="Wingdings" panose="05000000000000000000" pitchFamily="2" charset="2"/>
+              <a:buChar char="§"/>
+            </a:pPr>
+            <a:endParaRPr lang="en-US" dirty="0"/>
+          </a:p>
+          <a:p>
+            <a:pPr lvl="1">
+              <a:buFont typeface="Wingdings" panose="05000000000000000000" pitchFamily="2" charset="2"/>
+              <a:buChar char="§"/>
+            </a:pPr>
+            <a:r>
+              <a:rPr lang="en-US" dirty="0"/>
+              <a:t>At most 34 blocks can be lost regardless of bits dropped or added.</a:t>
+            </a:r>
+          </a:p>
+          <a:p>
             <a:endParaRPr lang="en-US" dirty="0"/>
           </a:p>
           <a:p>
@@ -15269,7 +16216,7 @@
             <p:ph idx="1"/>
             <p:extLst>
               <p:ext uri="{D42A27DB-BD31-4B8C-83A1-F6EECF244321}">
-                <p14:modId xmlns:p14="http://schemas.microsoft.com/office/powerpoint/2010/main" val="1318996803"/>
+                <p14:modId xmlns:p14="http://schemas.microsoft.com/office/powerpoint/2010/main" val="3084893784"/>
               </p:ext>
             </p:extLst>
           </p:nvPr>
@@ -15284,6 +16231,35 @@
           </a:graphicData>
         </a:graphic>
       </p:graphicFrame>
+      <p:sp>
+        <p:nvSpPr>
+          <p:cNvPr id="3" name="Slide Number Placeholder 2">
+            <a:extLst>
+              <a:ext uri="{FF2B5EF4-FFF2-40B4-BE49-F238E27FC236}">
+                <a16:creationId xmlns:a16="http://schemas.microsoft.com/office/drawing/2014/main" id="{C8891DF2-5915-98A2-109D-A440E2670526}"/>
+              </a:ext>
+            </a:extLst>
+          </p:cNvPr>
+          <p:cNvSpPr>
+            <a:spLocks noGrp="1"/>
+          </p:cNvSpPr>
+          <p:nvPr>
+            <p:ph type="sldNum" sz="quarter" idx="12"/>
+          </p:nvPr>
+        </p:nvSpPr>
+        <p:spPr/>
+        <p:txBody>
+          <a:bodyPr/>
+          <a:lstStyle/>
+          <a:p>
+            <a:fld id="{9F0033A3-9C62-4E6A-AA88-01AE2E6B437E}" type="slidenum">
+              <a:rPr lang="en-US" smtClean="0"/>
+              <a:t>8</a:t>
+            </a:fld>
+            <a:endParaRPr lang="en-US"/>
+          </a:p>
+        </p:txBody>
+      </p:sp>
     </p:spTree>
     <p:extLst>
       <p:ext uri="{BB962C8B-B14F-4D97-AF65-F5344CB8AC3E}">
@@ -15475,6 +16451,35 @@
           </a:graphicData>
         </a:graphic>
       </p:graphicFrame>
+      <p:sp>
+        <p:nvSpPr>
+          <p:cNvPr id="4" name="Slide Number Placeholder 3">
+            <a:extLst>
+              <a:ext uri="{FF2B5EF4-FFF2-40B4-BE49-F238E27FC236}">
+                <a16:creationId xmlns:a16="http://schemas.microsoft.com/office/drawing/2014/main" id="{AE464FFA-9512-4228-9863-670F4A01A703}"/>
+              </a:ext>
+            </a:extLst>
+          </p:cNvPr>
+          <p:cNvSpPr>
+            <a:spLocks noGrp="1"/>
+          </p:cNvSpPr>
+          <p:nvPr>
+            <p:ph type="sldNum" sz="quarter" idx="12"/>
+          </p:nvPr>
+        </p:nvSpPr>
+        <p:spPr/>
+        <p:txBody>
+          <a:bodyPr/>
+          <a:lstStyle/>
+          <a:p>
+            <a:fld id="{9F0033A3-9C62-4E6A-AA88-01AE2E6B437E}" type="slidenum">
+              <a:rPr lang="en-US" smtClean="0"/>
+              <a:t>9</a:t>
+            </a:fld>
+            <a:endParaRPr lang="en-US"/>
+          </a:p>
+        </p:txBody>
+      </p:sp>
     </p:spTree>
     <p:extLst>
       <p:ext uri="{BB962C8B-B14F-4D97-AF65-F5344CB8AC3E}">
@@ -15769,4 +16774,299 @@
     </a:ext>
   </a:extLst>
 </a:theme>
+</file>
+
+<file path=ppt/theme/theme2.xml><?xml version="1.0" encoding="utf-8"?>
+<a:theme xmlns:a="http://schemas.openxmlformats.org/drawingml/2006/main" name="Office Theme">
+  <a:themeElements>
+    <a:clrScheme name="Office">
+      <a:dk1>
+        <a:sysClr val="windowText" lastClr="000000"/>
+      </a:dk1>
+      <a:lt1>
+        <a:sysClr val="window" lastClr="FFFFFF"/>
+      </a:lt1>
+      <a:dk2>
+        <a:srgbClr val="44546A"/>
+      </a:dk2>
+      <a:lt2>
+        <a:srgbClr val="E7E6E6"/>
+      </a:lt2>
+      <a:accent1>
+        <a:srgbClr val="4472C4"/>
+      </a:accent1>
+      <a:accent2>
+        <a:srgbClr val="ED7D31"/>
+      </a:accent2>
+      <a:accent3>
+        <a:srgbClr val="A5A5A5"/>
+      </a:accent3>
+      <a:accent4>
+        <a:srgbClr val="FFC000"/>
+      </a:accent4>
+      <a:accent5>
+        <a:srgbClr val="5B9BD5"/>
+      </a:accent5>
+      <a:accent6>
+        <a:srgbClr val="70AD47"/>
+      </a:accent6>
+      <a:hlink>
+        <a:srgbClr val="0563C1"/>
+      </a:hlink>
+      <a:folHlink>
+        <a:srgbClr val="954F72"/>
+      </a:folHlink>
+    </a:clrScheme>
+    <a:fontScheme name="Office">
+      <a:majorFont>
+        <a:latin typeface="Calibri Light" panose="020F0302020204030204"/>
+        <a:ea typeface=""/>
+        <a:cs typeface=""/>
+        <a:font script="Jpan" typeface="游ゴシック Light"/>
+        <a:font script="Hang" typeface="맑은 고딕"/>
+        <a:font script="Hans" typeface="等线 Light"/>
+        <a:font script="Hant" typeface="新細明體"/>
+        <a:font script="Arab" typeface="Times New Roman"/>
+        <a:font script="Hebr" typeface="Times New Roman"/>
+        <a:font script="Thai" typeface="Angsana New"/>
+        <a:font script="Ethi" typeface="Nyala"/>
+        <a:font script="Beng" typeface="Vrinda"/>
+        <a:font script="Gujr" typeface="Shruti"/>
+        <a:font script="Khmr" typeface="MoolBoran"/>
+        <a:font script="Knda" typeface="Tunga"/>
+        <a:font script="Guru" typeface="Raavi"/>
+        <a:font script="Cans" typeface="Euphemia"/>
+        <a:font script="Cher" typeface="Plantagenet Cherokee"/>
+        <a:font script="Yiii" typeface="Microsoft Yi Baiti"/>
+        <a:font script="Tibt" typeface="Microsoft Himalaya"/>
+        <a:font script="Thaa" typeface="MV Boli"/>
+        <a:font script="Deva" typeface="Mangal"/>
+        <a:font script="Telu" typeface="Gautami"/>
+        <a:font script="Taml" typeface="Latha"/>
+        <a:font script="Syrc" typeface="Estrangelo Edessa"/>
+        <a:font script="Orya" typeface="Kalinga"/>
+        <a:font script="Mlym" typeface="Kartika"/>
+        <a:font script="Laoo" typeface="DokChampa"/>
+        <a:font script="Sinh" typeface="Iskoola Pota"/>
+        <a:font script="Mong" typeface="Mongolian Baiti"/>
+        <a:font script="Viet" typeface="Times New Roman"/>
+        <a:font script="Uigh" typeface="Microsoft Uighur"/>
+        <a:font script="Geor" typeface="Sylfaen"/>
+        <a:font script="Armn" typeface="Arial"/>
+        <a:font script="Bugi" typeface="Leelawadee UI"/>
+        <a:font script="Bopo" typeface="Microsoft JhengHei"/>
+        <a:font script="Java" typeface="Javanese Text"/>
+        <a:font script="Lisu" typeface="Segoe UI"/>
+        <a:font script="Mymr" typeface="Myanmar Text"/>
+        <a:font script="Nkoo" typeface="Ebrima"/>
+        <a:font script="Olck" typeface="Nirmala UI"/>
+        <a:font script="Osma" typeface="Ebrima"/>
+        <a:font script="Phag" typeface="Phagspa"/>
+        <a:font script="Syrn" typeface="Estrangelo Edessa"/>
+        <a:font script="Syrj" typeface="Estrangelo Edessa"/>
+        <a:font script="Syre" typeface="Estrangelo Edessa"/>
+        <a:font script="Sora" typeface="Nirmala UI"/>
+        <a:font script="Tale" typeface="Microsoft Tai Le"/>
+        <a:font script="Talu" typeface="Microsoft New Tai Lue"/>
+        <a:font script="Tfng" typeface="Ebrima"/>
+      </a:majorFont>
+      <a:minorFont>
+        <a:latin typeface="Calibri" panose="020F0502020204030204"/>
+        <a:ea typeface=""/>
+        <a:cs typeface=""/>
+        <a:font script="Jpan" typeface="游ゴシック"/>
+        <a:font script="Hang" typeface="맑은 고딕"/>
+        <a:font script="Hans" typeface="等线"/>
+        <a:font script="Hant" typeface="新細明體"/>
+        <a:font script="Arab" typeface="Arial"/>
+        <a:font script="Hebr" typeface="Arial"/>
+        <a:font script="Thai" typeface="Cordia New"/>
+        <a:font script="Ethi" typeface="Nyala"/>
+        <a:font script="Beng" typeface="Vrinda"/>
+        <a:font script="Gujr" typeface="Shruti"/>
+        <a:font script="Khmr" typeface="DaunPenh"/>
+        <a:font script="Knda" typeface="Tunga"/>
+        <a:font script="Guru" typeface="Raavi"/>
+        <a:font script="Cans" typeface="Euphemia"/>
+        <a:font script="Cher" typeface="Plantagenet Cherokee"/>
+        <a:font script="Yiii" typeface="Microsoft Yi Baiti"/>
+        <a:font script="Tibt" typeface="Microsoft Himalaya"/>
+        <a:font script="Thaa" typeface="MV Boli"/>
+        <a:font script="Deva" typeface="Mangal"/>
+        <a:font script="Telu" typeface="Gautami"/>
+        <a:font script="Taml" typeface="Latha"/>
+        <a:font script="Syrc" typeface="Estrangelo Edessa"/>
+        <a:font script="Orya" typeface="Kalinga"/>
+        <a:font script="Mlym" typeface="Kartika"/>
+        <a:font script="Laoo" typeface="DokChampa"/>
+        <a:font script="Sinh" typeface="Iskoola Pota"/>
+        <a:font script="Mong" typeface="Mongolian Baiti"/>
+        <a:font script="Viet" typeface="Arial"/>
+        <a:font script="Uigh" typeface="Microsoft Uighur"/>
+        <a:font script="Geor" typeface="Sylfaen"/>
+        <a:font script="Armn" typeface="Arial"/>
+        <a:font script="Bugi" typeface="Leelawadee UI"/>
+        <a:font script="Bopo" typeface="Microsoft JhengHei"/>
+        <a:font script="Java" typeface="Javanese Text"/>
+        <a:font script="Lisu" typeface="Segoe UI"/>
+        <a:font script="Mymr" typeface="Myanmar Text"/>
+        <a:font script="Nkoo" typeface="Ebrima"/>
+        <a:font script="Olck" typeface="Nirmala UI"/>
+        <a:font script="Osma" typeface="Ebrima"/>
+        <a:font script="Phag" typeface="Phagspa"/>
+        <a:font script="Syrn" typeface="Estrangelo Edessa"/>
+        <a:font script="Syrj" typeface="Estrangelo Edessa"/>
+        <a:font script="Syre" typeface="Estrangelo Edessa"/>
+        <a:font script="Sora" typeface="Nirmala UI"/>
+        <a:font script="Tale" typeface="Microsoft Tai Le"/>
+        <a:font script="Talu" typeface="Microsoft New Tai Lue"/>
+        <a:font script="Tfng" typeface="Ebrima"/>
+      </a:minorFont>
+    </a:fontScheme>
+    <a:fmtScheme name="Office">
+      <a:fillStyleLst>
+        <a:solidFill>
+          <a:schemeClr val="phClr"/>
+        </a:solidFill>
+        <a:gradFill rotWithShape="1">
+          <a:gsLst>
+            <a:gs pos="0">
+              <a:schemeClr val="phClr">
+                <a:lumMod val="110000"/>
+                <a:satMod val="105000"/>
+                <a:tint val="67000"/>
+              </a:schemeClr>
+            </a:gs>
+            <a:gs pos="50000">
+              <a:schemeClr val="phClr">
+                <a:lumMod val="105000"/>
+                <a:satMod val="103000"/>
+                <a:tint val="73000"/>
+              </a:schemeClr>
+            </a:gs>
+            <a:gs pos="100000">
+              <a:schemeClr val="phClr">
+                <a:lumMod val="105000"/>
+                <a:satMod val="109000"/>
+                <a:tint val="81000"/>
+              </a:schemeClr>
+            </a:gs>
+          </a:gsLst>
+          <a:lin ang="5400000" scaled="0"/>
+        </a:gradFill>
+        <a:gradFill rotWithShape="1">
+          <a:gsLst>
+            <a:gs pos="0">
+              <a:schemeClr val="phClr">
+                <a:satMod val="103000"/>
+                <a:lumMod val="102000"/>
+                <a:tint val="94000"/>
+              </a:schemeClr>
+            </a:gs>
+            <a:gs pos="50000">
+              <a:schemeClr val="phClr">
+                <a:satMod val="110000"/>
+                <a:lumMod val="100000"/>
+                <a:shade val="100000"/>
+              </a:schemeClr>
+            </a:gs>
+            <a:gs pos="100000">
+              <a:schemeClr val="phClr">
+                <a:lumMod val="99000"/>
+                <a:satMod val="120000"/>
+                <a:shade val="78000"/>
+              </a:schemeClr>
+            </a:gs>
+          </a:gsLst>
+          <a:lin ang="5400000" scaled="0"/>
+        </a:gradFill>
+      </a:fillStyleLst>
+      <a:lnStyleLst>
+        <a:ln w="6350" cap="flat" cmpd="sng" algn="ctr">
+          <a:solidFill>
+            <a:schemeClr val="phClr"/>
+          </a:solidFill>
+          <a:prstDash val="solid"/>
+          <a:miter lim="800000"/>
+        </a:ln>
+        <a:ln w="12700" cap="flat" cmpd="sng" algn="ctr">
+          <a:solidFill>
+            <a:schemeClr val="phClr"/>
+          </a:solidFill>
+          <a:prstDash val="solid"/>
+          <a:miter lim="800000"/>
+        </a:ln>
+        <a:ln w="19050" cap="flat" cmpd="sng" algn="ctr">
+          <a:solidFill>
+            <a:schemeClr val="phClr"/>
+          </a:solidFill>
+          <a:prstDash val="solid"/>
+          <a:miter lim="800000"/>
+        </a:ln>
+      </a:lnStyleLst>
+      <a:effectStyleLst>
+        <a:effectStyle>
+          <a:effectLst/>
+        </a:effectStyle>
+        <a:effectStyle>
+          <a:effectLst/>
+        </a:effectStyle>
+        <a:effectStyle>
+          <a:effectLst>
+            <a:outerShdw blurRad="57150" dist="19050" dir="5400000" algn="ctr" rotWithShape="0">
+              <a:srgbClr val="000000">
+                <a:alpha val="63000"/>
+              </a:srgbClr>
+            </a:outerShdw>
+          </a:effectLst>
+        </a:effectStyle>
+      </a:effectStyleLst>
+      <a:bgFillStyleLst>
+        <a:solidFill>
+          <a:schemeClr val="phClr"/>
+        </a:solidFill>
+        <a:solidFill>
+          <a:schemeClr val="phClr">
+            <a:tint val="95000"/>
+            <a:satMod val="170000"/>
+          </a:schemeClr>
+        </a:solidFill>
+        <a:gradFill rotWithShape="1">
+          <a:gsLst>
+            <a:gs pos="0">
+              <a:schemeClr val="phClr">
+                <a:tint val="93000"/>
+                <a:satMod val="150000"/>
+                <a:shade val="98000"/>
+                <a:lumMod val="102000"/>
+              </a:schemeClr>
+            </a:gs>
+            <a:gs pos="50000">
+              <a:schemeClr val="phClr">
+                <a:tint val="98000"/>
+                <a:satMod val="130000"/>
+                <a:shade val="90000"/>
+                <a:lumMod val="103000"/>
+              </a:schemeClr>
+            </a:gs>
+            <a:gs pos="100000">
+              <a:schemeClr val="phClr">
+                <a:shade val="63000"/>
+                <a:satMod val="120000"/>
+              </a:schemeClr>
+            </a:gs>
+          </a:gsLst>
+          <a:lin ang="5400000" scaled="0"/>
+        </a:gradFill>
+      </a:bgFillStyleLst>
+    </a:fmtScheme>
+  </a:themeElements>
+  <a:objectDefaults/>
+  <a:extraClrSchemeLst/>
+  <a:extLst>
+    <a:ext uri="{05A4C25C-085E-4340-85A3-A5531E510DB2}">
+      <thm15:themeFamily xmlns:thm15="http://schemas.microsoft.com/office/thememl/2012/main" name="Office Theme" id="{62F939B6-93AF-4DB8-9C6B-D6C7DFDC589F}" vid="{4A3C46E8-61CC-4603-A589-7422A47A8E4A}"/>
+    </a:ext>
+  </a:extLst>
+</a:theme>
 </file>
</xml_diff>